<commit_message>
updating ppt to other factors
</commit_message>
<xml_diff>
--- a/MLC40_Maniraj_Madishetty.pptx
+++ b/MLC40_Maniraj_Madishetty.pptx
@@ -15,7 +15,8 @@
     <p:sldId id="265" r:id="rId9"/>
     <p:sldId id="266" r:id="rId10"/>
     <p:sldId id="267" r:id="rId11"/>
-    <p:sldId id="261" r:id="rId12"/>
+    <p:sldId id="268" r:id="rId12"/>
+    <p:sldId id="261" r:id="rId13"/>
   </p:sldIdLst>
   <p:sldSz cx="12192000" cy="6858000"/>
   <p:notesSz cx="6858000" cy="9144000"/>
@@ -5184,7 +5185,7 @@
           <a:p>
             <a:fld id="{846CE7D5-CF57-46EF-B807-FDD0502418D4}" type="datetimeFigureOut">
               <a:rPr lang="en-US" smtClean="0"/>
-              <a:t>6/4/2022</a:t>
+              <a:t>6/6/2022</a:t>
             </a:fld>
             <a:endParaRPr lang="en-US"/>
           </a:p>
@@ -5352,7 +5353,7 @@
           <a:p>
             <a:fld id="{846CE7D5-CF57-46EF-B807-FDD0502418D4}" type="datetimeFigureOut">
               <a:rPr lang="en-US" smtClean="0"/>
-              <a:t>6/4/2022</a:t>
+              <a:t>6/6/2022</a:t>
             </a:fld>
             <a:endParaRPr lang="en-US"/>
           </a:p>
@@ -5530,7 +5531,7 @@
           <a:p>
             <a:fld id="{846CE7D5-CF57-46EF-B807-FDD0502418D4}" type="datetimeFigureOut">
               <a:rPr lang="en-US" smtClean="0"/>
-              <a:t>6/4/2022</a:t>
+              <a:t>6/6/2022</a:t>
             </a:fld>
             <a:endParaRPr lang="en-US"/>
           </a:p>
@@ -5698,7 +5699,7 @@
           <a:p>
             <a:fld id="{846CE7D5-CF57-46EF-B807-FDD0502418D4}" type="datetimeFigureOut">
               <a:rPr lang="en-US" smtClean="0"/>
-              <a:t>6/4/2022</a:t>
+              <a:t>6/6/2022</a:t>
             </a:fld>
             <a:endParaRPr lang="en-US"/>
           </a:p>
@@ -5943,7 +5944,7 @@
           <a:p>
             <a:fld id="{846CE7D5-CF57-46EF-B807-FDD0502418D4}" type="datetimeFigureOut">
               <a:rPr lang="en-US" smtClean="0"/>
-              <a:t>6/4/2022</a:t>
+              <a:t>6/6/2022</a:t>
             </a:fld>
             <a:endParaRPr lang="en-US"/>
           </a:p>
@@ -6172,7 +6173,7 @@
           <a:p>
             <a:fld id="{846CE7D5-CF57-46EF-B807-FDD0502418D4}" type="datetimeFigureOut">
               <a:rPr lang="en-US" smtClean="0"/>
-              <a:t>6/4/2022</a:t>
+              <a:t>6/6/2022</a:t>
             </a:fld>
             <a:endParaRPr lang="en-US"/>
           </a:p>
@@ -6536,7 +6537,7 @@
           <a:p>
             <a:fld id="{846CE7D5-CF57-46EF-B807-FDD0502418D4}" type="datetimeFigureOut">
               <a:rPr lang="en-US" smtClean="0"/>
-              <a:t>6/4/2022</a:t>
+              <a:t>6/6/2022</a:t>
             </a:fld>
             <a:endParaRPr lang="en-US"/>
           </a:p>
@@ -6653,7 +6654,7 @@
           <a:p>
             <a:fld id="{846CE7D5-CF57-46EF-B807-FDD0502418D4}" type="datetimeFigureOut">
               <a:rPr lang="en-US" smtClean="0"/>
-              <a:t>6/4/2022</a:t>
+              <a:t>6/6/2022</a:t>
             </a:fld>
             <a:endParaRPr lang="en-US"/>
           </a:p>
@@ -6748,7 +6749,7 @@
           <a:p>
             <a:fld id="{846CE7D5-CF57-46EF-B807-FDD0502418D4}" type="datetimeFigureOut">
               <a:rPr lang="en-US" smtClean="0"/>
-              <a:t>6/4/2022</a:t>
+              <a:t>6/6/2022</a:t>
             </a:fld>
             <a:endParaRPr lang="en-US"/>
           </a:p>
@@ -7023,7 +7024,7 @@
           <a:p>
             <a:fld id="{846CE7D5-CF57-46EF-B807-FDD0502418D4}" type="datetimeFigureOut">
               <a:rPr lang="en-US" smtClean="0"/>
-              <a:t>6/4/2022</a:t>
+              <a:t>6/6/2022</a:t>
             </a:fld>
             <a:endParaRPr lang="en-US"/>
           </a:p>
@@ -7278,7 +7279,7 @@
           <a:p>
             <a:fld id="{846CE7D5-CF57-46EF-B807-FDD0502418D4}" type="datetimeFigureOut">
               <a:rPr lang="en-US" smtClean="0"/>
-              <a:t>6/4/2022</a:t>
+              <a:t>6/6/2022</a:t>
             </a:fld>
             <a:endParaRPr lang="en-US"/>
           </a:p>
@@ -7489,7 +7490,7 @@
           <a:p>
             <a:fld id="{846CE7D5-CF57-46EF-B807-FDD0502418D4}" type="datetimeFigureOut">
               <a:rPr lang="en-US" smtClean="0"/>
-              <a:t>6/4/2022</a:t>
+              <a:t>6/6/2022</a:t>
             </a:fld>
             <a:endParaRPr lang="en-US"/>
           </a:p>
@@ -8738,6 +8739,167 @@
 <file path=ppt/slides/slide11.xml><?xml version="1.0" encoding="utf-8"?>
 <p:sld xmlns:a="http://schemas.openxmlformats.org/drawingml/2006/main" xmlns:r="http://schemas.openxmlformats.org/officeDocument/2006/relationships" xmlns:p="http://schemas.openxmlformats.org/presentationml/2006/main">
   <p:cSld>
+    <p:spTree>
+      <p:nvGrpSpPr>
+        <p:cNvPr id="1" name=""/>
+        <p:cNvGrpSpPr/>
+        <p:nvPr/>
+      </p:nvGrpSpPr>
+      <p:grpSpPr>
+        <a:xfrm>
+          <a:off x="0" y="0"/>
+          <a:ext cx="0" cy="0"/>
+          <a:chOff x="0" y="0"/>
+          <a:chExt cx="0" cy="0"/>
+        </a:xfrm>
+      </p:grpSpPr>
+      <p:sp>
+        <p:nvSpPr>
+          <p:cNvPr id="2" name="Title 1">
+            <a:extLst>
+              <a:ext uri="{FF2B5EF4-FFF2-40B4-BE49-F238E27FC236}">
+                <a16:creationId xmlns:a16="http://schemas.microsoft.com/office/drawing/2014/main" id="{1E7E173B-3386-1DCF-45B2-9AA276541682}"/>
+              </a:ext>
+            </a:extLst>
+          </p:cNvPr>
+          <p:cNvSpPr>
+            <a:spLocks noGrp="1"/>
+          </p:cNvSpPr>
+          <p:nvPr>
+            <p:ph type="title"/>
+          </p:nvPr>
+        </p:nvSpPr>
+        <p:spPr/>
+        <p:txBody>
+          <a:bodyPr/>
+          <a:lstStyle/>
+          <a:p>
+            <a:r>
+              <a:rPr lang="en-IN" dirty="0"/>
+              <a:t>Other factors:</a:t>
+            </a:r>
+          </a:p>
+        </p:txBody>
+      </p:sp>
+      <p:sp>
+        <p:nvSpPr>
+          <p:cNvPr id="3" name="Content Placeholder 2">
+            <a:extLst>
+              <a:ext uri="{FF2B5EF4-FFF2-40B4-BE49-F238E27FC236}">
+                <a16:creationId xmlns:a16="http://schemas.microsoft.com/office/drawing/2014/main" id="{D9D6AC98-B909-F332-9C69-B7CED62772AD}"/>
+              </a:ext>
+            </a:extLst>
+          </p:cNvPr>
+          <p:cNvSpPr>
+            <a:spLocks noGrp="1"/>
+          </p:cNvSpPr>
+          <p:nvPr>
+            <p:ph idx="1"/>
+          </p:nvPr>
+        </p:nvSpPr>
+        <p:spPr/>
+        <p:txBody>
+          <a:bodyPr>
+            <a:normAutofit lnSpcReduction="10000"/>
+          </a:bodyPr>
+          <a:lstStyle/>
+          <a:p>
+            <a:r>
+              <a:rPr lang="en-IN" dirty="0"/>
+              <a:t>State : huge variance in </a:t>
+            </a:r>
+            <a:r>
+              <a:rPr lang="en-IN" dirty="0" err="1"/>
+              <a:t>chargeoff</a:t>
+            </a:r>
+            <a:r>
+              <a:rPr lang="en-IN" dirty="0"/>
+              <a:t>% from state to state.</a:t>
+            </a:r>
+          </a:p>
+          <a:p>
+            <a:r>
+              <a:rPr lang="en-IN" dirty="0"/>
+              <a:t>Zip code : huge variance in </a:t>
+            </a:r>
+            <a:r>
+              <a:rPr lang="en-IN" dirty="0" err="1"/>
+              <a:t>chargeoff</a:t>
+            </a:r>
+            <a:r>
+              <a:rPr lang="en-IN" dirty="0"/>
+              <a:t>% from one to other.</a:t>
+            </a:r>
+          </a:p>
+          <a:p>
+            <a:r>
+              <a:rPr lang="en-IN" dirty="0"/>
+              <a:t>House category: others have high </a:t>
+            </a:r>
+            <a:r>
+              <a:rPr lang="en-IN" dirty="0" err="1"/>
+              <a:t>chargeoff</a:t>
+            </a:r>
+            <a:r>
+              <a:rPr lang="en-IN" dirty="0"/>
+              <a:t>%</a:t>
+            </a:r>
+          </a:p>
+          <a:p>
+            <a:endParaRPr lang="en-IN" dirty="0"/>
+          </a:p>
+          <a:p>
+            <a:endParaRPr lang="en-IN" dirty="0"/>
+          </a:p>
+          <a:p>
+            <a:pPr marL="0" indent="0">
+              <a:buNone/>
+            </a:pPr>
+            <a:endParaRPr lang="en-IN" dirty="0"/>
+          </a:p>
+          <a:p>
+            <a:pPr marL="0" indent="0">
+              <a:buNone/>
+            </a:pPr>
+            <a:endParaRPr lang="en-IN" dirty="0"/>
+          </a:p>
+          <a:p>
+            <a:pPr marL="0" indent="0">
+              <a:buNone/>
+            </a:pPr>
+            <a:endParaRPr lang="en-IN" dirty="0"/>
+          </a:p>
+          <a:p>
+            <a:pPr marL="0" indent="0">
+              <a:buNone/>
+            </a:pPr>
+            <a:r>
+              <a:rPr lang="en-IN" dirty="0" err="1"/>
+              <a:t>Chargeoff</a:t>
+            </a:r>
+            <a:r>
+              <a:rPr lang="en-IN" dirty="0"/>
+              <a:t>% = proportion of charged off members across total sampling.</a:t>
+            </a:r>
+          </a:p>
+        </p:txBody>
+      </p:sp>
+    </p:spTree>
+    <p:extLst>
+      <p:ext uri="{BB962C8B-B14F-4D97-AF65-F5344CB8AC3E}">
+        <p14:creationId xmlns:p14="http://schemas.microsoft.com/office/powerpoint/2010/main" val="3394079860"/>
+      </p:ext>
+    </p:extLst>
+  </p:cSld>
+  <p:clrMapOvr>
+    <a:masterClrMapping/>
+  </p:clrMapOvr>
+</p:sld>
+</file>
+
+<file path=ppt/slides/slide12.xml><?xml version="1.0" encoding="utf-8"?>
+<p:sld xmlns:a="http://schemas.openxmlformats.org/drawingml/2006/main" xmlns:r="http://schemas.openxmlformats.org/officeDocument/2006/relationships" xmlns:p="http://schemas.openxmlformats.org/presentationml/2006/main">
+  <p:cSld>
     <p:bg>
       <p:bgPr>
         <a:solidFill>

</xml_diff>